<commit_message>
updated stand up and removed redundant comments
</commit_message>
<xml_diff>
--- a/presentation/Standup 1.pptx
+++ b/presentation/Standup 1.pptx
@@ -5,15 +5,16 @@
     <p:sldMasterId id="2147483660" r:id="rId4"/>
   </p:sldMasterIdLst>
   <p:notesMasterIdLst>
-    <p:notesMasterId r:id="rId11"/>
+    <p:notesMasterId r:id="rId12"/>
   </p:notesMasterIdLst>
   <p:sldIdLst>
     <p:sldId id="256" r:id="rId5"/>
     <p:sldId id="257" r:id="rId6"/>
     <p:sldId id="258" r:id="rId7"/>
-    <p:sldId id="259" r:id="rId8"/>
-    <p:sldId id="261" r:id="rId9"/>
-    <p:sldId id="260" r:id="rId10"/>
+    <p:sldId id="262" r:id="rId8"/>
+    <p:sldId id="259" r:id="rId9"/>
+    <p:sldId id="261" r:id="rId10"/>
+    <p:sldId id="260" r:id="rId11"/>
   </p:sldIdLst>
   <p:sldSz cx="12192000" cy="6858000"/>
   <p:notesSz cx="6858000" cy="9144000"/>
@@ -202,7 +203,7 @@
           <a:p>
             <a:fld id="{0D041FD0-D915-4EC7-8384-5AFD352B34A1}" type="datetimeFigureOut">
               <a:rPr lang="en-US" smtClean="0"/>
-              <a:t>9/23/24</a:t>
+              <a:t>9/26/24</a:t>
             </a:fld>
             <a:endParaRPr lang="en-US"/>
           </a:p>
@@ -562,6 +563,144 @@
 </p:notes>
 </file>
 
+<file path=ppt/notesSlides/notesSlide2.xml><?xml version="1.0" encoding="utf-8"?>
+<p:notes xmlns:a="http://schemas.openxmlformats.org/drawingml/2006/main" xmlns:r="http://schemas.openxmlformats.org/officeDocument/2006/relationships" xmlns:p="http://schemas.openxmlformats.org/presentationml/2006/main">
+  <p:cSld>
+    <p:spTree>
+      <p:nvGrpSpPr>
+        <p:cNvPr id="1" name=""/>
+        <p:cNvGrpSpPr/>
+        <p:nvPr/>
+      </p:nvGrpSpPr>
+      <p:grpSpPr>
+        <a:xfrm>
+          <a:off x="0" y="0"/>
+          <a:ext cx="0" cy="0"/>
+          <a:chOff x="0" y="0"/>
+          <a:chExt cx="0" cy="0"/>
+        </a:xfrm>
+      </p:grpSpPr>
+      <p:sp>
+        <p:nvSpPr>
+          <p:cNvPr id="2" name="Slide Image Placeholder 1"/>
+          <p:cNvSpPr>
+            <a:spLocks noGrp="1" noRot="1" noChangeAspect="1"/>
+          </p:cNvSpPr>
+          <p:nvPr>
+            <p:ph type="sldImg"/>
+          </p:nvPr>
+        </p:nvSpPr>
+        <p:spPr/>
+      </p:sp>
+      <p:sp>
+        <p:nvSpPr>
+          <p:cNvPr id="3" name="Notes Placeholder 2"/>
+          <p:cNvSpPr>
+            <a:spLocks noGrp="1"/>
+          </p:cNvSpPr>
+          <p:nvPr>
+            <p:ph type="body" idx="1"/>
+          </p:nvPr>
+        </p:nvSpPr>
+        <p:spPr/>
+        <p:txBody>
+          <a:bodyPr/>
+          <a:lstStyle/>
+          <a:p>
+            <a:r>
+              <a:rPr lang="en-US" b="0" dirty="0">
+                <a:solidFill>
+                  <a:srgbClr val="CCCCCC"/>
+                </a:solidFill>
+                <a:effectLst/>
+                <a:latin typeface="Menlo" panose="020B0609030804020204" pitchFamily="49" charset="0"/>
+              </a:rPr>
+              <a:t>Total Return shows how much profit the strategy made as a percentage of the initial capital.</a:t>
+            </a:r>
+          </a:p>
+          <a:p>
+            <a:br>
+              <a:rPr lang="en-US" b="0" dirty="0">
+                <a:solidFill>
+                  <a:srgbClr val="CCCCCC"/>
+                </a:solidFill>
+                <a:effectLst/>
+                <a:latin typeface="Menlo" panose="020B0609030804020204" pitchFamily="49" charset="0"/>
+              </a:rPr>
+            </a:br>
+            <a:r>
+              <a:rPr lang="en-US" b="0" dirty="0">
+                <a:solidFill>
+                  <a:srgbClr val="CCCCCC"/>
+                </a:solidFill>
+                <a:effectLst/>
+                <a:latin typeface="Menlo" panose="020B0609030804020204" pitchFamily="49" charset="0"/>
+              </a:rPr>
+              <a:t>Max Drawdown shows the worst-case scenario of how much the portfolio could have lost from its highest point.</a:t>
+            </a:r>
+          </a:p>
+          <a:p>
+            <a:br>
+              <a:rPr lang="en-US" b="0" dirty="0">
+                <a:solidFill>
+                  <a:srgbClr val="CCCCCC"/>
+                </a:solidFill>
+                <a:effectLst/>
+                <a:latin typeface="Menlo" panose="020B0609030804020204" pitchFamily="49" charset="0"/>
+              </a:rPr>
+            </a:br>
+            <a:r>
+              <a:rPr lang="en-US" b="0" dirty="0">
+                <a:solidFill>
+                  <a:srgbClr val="CCCCCC"/>
+                </a:solidFill>
+                <a:effectLst/>
+                <a:latin typeface="Menlo" panose="020B0609030804020204" pitchFamily="49" charset="0"/>
+              </a:rPr>
+              <a:t>Sharpe Ratio evaluates how much return you earned for the risk you took, with a higher ratio indicating a better risk-adjusted return.</a:t>
+            </a:r>
+          </a:p>
+          <a:p>
+            <a:endParaRPr lang="en-US" dirty="0"/>
+          </a:p>
+        </p:txBody>
+      </p:sp>
+      <p:sp>
+        <p:nvSpPr>
+          <p:cNvPr id="4" name="Slide Number Placeholder 3"/>
+          <p:cNvSpPr>
+            <a:spLocks noGrp="1"/>
+          </p:cNvSpPr>
+          <p:nvPr>
+            <p:ph type="sldNum" sz="quarter" idx="5"/>
+          </p:nvPr>
+        </p:nvSpPr>
+        <p:spPr/>
+        <p:txBody>
+          <a:bodyPr/>
+          <a:lstStyle/>
+          <a:p>
+            <a:fld id="{531D13CD-66F2-4CB3-ACBB-6CF6081D754D}" type="slidenum">
+              <a:rPr lang="en-US" smtClean="0"/>
+              <a:t>7</a:t>
+            </a:fld>
+            <a:endParaRPr lang="en-US"/>
+          </a:p>
+        </p:txBody>
+      </p:sp>
+    </p:spTree>
+    <p:extLst>
+      <p:ext uri="{BB962C8B-B14F-4D97-AF65-F5344CB8AC3E}">
+        <p14:creationId xmlns:p14="http://schemas.microsoft.com/office/powerpoint/2010/main" val="1662669872"/>
+      </p:ext>
+    </p:extLst>
+  </p:cSld>
+  <p:clrMapOvr>
+    <a:masterClrMapping/>
+  </p:clrMapOvr>
+</p:notes>
+</file>
+
 <file path=ppt/slideLayouts/slideLayout1.xml><?xml version="1.0" encoding="utf-8"?>
 <p:sldLayout xmlns:a="http://schemas.openxmlformats.org/drawingml/2006/main" xmlns:r="http://schemas.openxmlformats.org/officeDocument/2006/relationships" xmlns:p="http://schemas.openxmlformats.org/presentationml/2006/main" type="title" preserve="1">
   <p:cSld name="Title Slide">
@@ -720,7 +859,7 @@
           <a:p>
             <a:fld id="{02AC24A9-CCB6-4F8D-B8DB-C2F3692CFA5A}" type="datetimeFigureOut">
               <a:rPr lang="en-US" smtClean="0"/>
-              <a:t>9/23/24</a:t>
+              <a:t>9/26/24</a:t>
             </a:fld>
             <a:endParaRPr lang="en-US" dirty="0"/>
           </a:p>
@@ -1090,7 +1229,7 @@
           <a:p>
             <a:fld id="{02AC24A9-CCB6-4F8D-B8DB-C2F3692CFA5A}" type="datetimeFigureOut">
               <a:rPr lang="en-US" smtClean="0"/>
-              <a:t>9/23/24</a:t>
+              <a:t>9/26/24</a:t>
             </a:fld>
             <a:endParaRPr lang="en-US"/>
           </a:p>
@@ -1299,7 +1438,7 @@
           <a:p>
             <a:fld id="{02AC24A9-CCB6-4F8D-B8DB-C2F3692CFA5A}" type="datetimeFigureOut">
               <a:rPr lang="en-US" smtClean="0"/>
-              <a:t>9/23/24</a:t>
+              <a:t>9/26/24</a:t>
             </a:fld>
             <a:endParaRPr lang="en-US"/>
           </a:p>
@@ -1771,7 +1910,7 @@
           <a:p>
             <a:fld id="{02AC24A9-CCB6-4F8D-B8DB-C2F3692CFA5A}" type="datetimeFigureOut">
               <a:rPr lang="en-US" smtClean="0"/>
-              <a:t>9/23/24</a:t>
+              <a:t>9/26/24</a:t>
             </a:fld>
             <a:endParaRPr lang="en-US"/>
           </a:p>
@@ -2226,7 +2365,7 @@
           <a:p>
             <a:fld id="{02AC24A9-CCB6-4F8D-B8DB-C2F3692CFA5A}" type="datetimeFigureOut">
               <a:rPr lang="en-US" smtClean="0"/>
-              <a:t>9/23/24</a:t>
+              <a:t>9/26/24</a:t>
             </a:fld>
             <a:endParaRPr lang="en-US"/>
           </a:p>
@@ -2761,7 +2900,7 @@
           <a:p>
             <a:fld id="{02AC24A9-CCB6-4F8D-B8DB-C2F3692CFA5A}" type="datetimeFigureOut">
               <a:rPr lang="en-US" smtClean="0"/>
-              <a:t>9/23/24</a:t>
+              <a:t>9/26/24</a:t>
             </a:fld>
             <a:endParaRPr lang="en-US"/>
           </a:p>
@@ -3463,7 +3602,7 @@
           <a:p>
             <a:fld id="{02AC24A9-CCB6-4F8D-B8DB-C2F3692CFA5A}" type="datetimeFigureOut">
               <a:rPr lang="en-US" smtClean="0"/>
-              <a:t>9/23/24</a:t>
+              <a:t>9/26/24</a:t>
             </a:fld>
             <a:endParaRPr lang="en-US"/>
           </a:p>
@@ -3793,7 +3932,7 @@
           <a:p>
             <a:fld id="{02AC24A9-CCB6-4F8D-B8DB-C2F3692CFA5A}" type="datetimeFigureOut">
               <a:rPr lang="en-US" smtClean="0"/>
-              <a:t>9/23/24</a:t>
+              <a:t>9/26/24</a:t>
             </a:fld>
             <a:endParaRPr lang="en-US"/>
           </a:p>
@@ -3906,7 +4045,7 @@
           <a:p>
             <a:fld id="{02AC24A9-CCB6-4F8D-B8DB-C2F3692CFA5A}" type="datetimeFigureOut">
               <a:rPr lang="en-US" smtClean="0"/>
-              <a:t>9/23/24</a:t>
+              <a:t>9/26/24</a:t>
             </a:fld>
             <a:endParaRPr lang="en-US"/>
           </a:p>
@@ -4403,7 +4542,7 @@
           <a:p>
             <a:fld id="{02AC24A9-CCB6-4F8D-B8DB-C2F3692CFA5A}" type="datetimeFigureOut">
               <a:rPr lang="en-US" smtClean="0"/>
-              <a:t>9/23/24</a:t>
+              <a:t>9/26/24</a:t>
             </a:fld>
             <a:endParaRPr lang="en-US" dirty="0"/>
           </a:p>
@@ -4882,7 +5021,7 @@
           <a:p>
             <a:fld id="{02AC24A9-CCB6-4F8D-B8DB-C2F3692CFA5A}" type="datetimeFigureOut">
               <a:rPr lang="en-US" smtClean="0"/>
-              <a:t>9/23/24</a:t>
+              <a:t>9/26/24</a:t>
             </a:fld>
             <a:endParaRPr lang="en-US"/>
           </a:p>
@@ -5125,7 +5264,7 @@
           <a:p>
             <a:fld id="{02AC24A9-CCB6-4F8D-B8DB-C2F3692CFA5A}" type="datetimeFigureOut">
               <a:rPr lang="en-US" smtClean="0"/>
-              <a:t>9/23/24</a:t>
+              <a:t>9/26/24</a:t>
             </a:fld>
             <a:endParaRPr lang="en-US"/>
           </a:p>
@@ -5832,6 +5971,160 @@
           <a:chExt cx="0" cy="0"/>
         </a:xfrm>
       </p:grpSpPr>
+      <p:sp>
+        <p:nvSpPr>
+          <p:cNvPr id="2" name="Title 1">
+            <a:extLst>
+              <a:ext uri="{FF2B5EF4-FFF2-40B4-BE49-F238E27FC236}">
+                <a16:creationId xmlns:a16="http://schemas.microsoft.com/office/drawing/2014/main" id="{5095ADE8-66DD-0A7A-843A-83E594064211}"/>
+              </a:ext>
+            </a:extLst>
+          </p:cNvPr>
+          <p:cNvSpPr>
+            <a:spLocks noGrp="1"/>
+          </p:cNvSpPr>
+          <p:nvPr>
+            <p:ph type="title"/>
+          </p:nvPr>
+        </p:nvSpPr>
+        <p:spPr/>
+        <p:txBody>
+          <a:bodyPr/>
+          <a:lstStyle/>
+          <a:p>
+            <a:r>
+              <a:rPr lang="en-US" dirty="0"/>
+              <a:t>Update</a:t>
+            </a:r>
+          </a:p>
+        </p:txBody>
+      </p:sp>
+      <p:sp>
+        <p:nvSpPr>
+          <p:cNvPr id="3" name="Content Placeholder 2">
+            <a:extLst>
+              <a:ext uri="{FF2B5EF4-FFF2-40B4-BE49-F238E27FC236}">
+                <a16:creationId xmlns:a16="http://schemas.microsoft.com/office/drawing/2014/main" id="{AE3DD14E-D900-DD78-E119-D72737B7BB70}"/>
+              </a:ext>
+            </a:extLst>
+          </p:cNvPr>
+          <p:cNvSpPr>
+            <a:spLocks noGrp="1"/>
+          </p:cNvSpPr>
+          <p:nvPr>
+            <p:ph idx="1"/>
+          </p:nvPr>
+        </p:nvSpPr>
+        <p:spPr>
+          <a:xfrm>
+            <a:off x="1115568" y="2478023"/>
+            <a:ext cx="10168128" cy="4295851"/>
+          </a:xfrm>
+        </p:spPr>
+        <p:txBody>
+          <a:bodyPr>
+            <a:normAutofit/>
+          </a:bodyPr>
+          <a:lstStyle/>
+          <a:p>
+            <a:r>
+              <a:rPr lang="en-US" dirty="0"/>
+              <a:t>Implemented </a:t>
+            </a:r>
+          </a:p>
+          <a:p>
+            <a:pPr lvl="1"/>
+            <a:r>
+              <a:rPr lang="en-US" dirty="0"/>
+              <a:t>Simple Moving averages(MA) strategy</a:t>
+            </a:r>
+          </a:p>
+          <a:p>
+            <a:pPr lvl="2"/>
+            <a:r>
+              <a:rPr lang="en-US" dirty="0"/>
+              <a:t>Back Testing in progress</a:t>
+            </a:r>
+          </a:p>
+          <a:p>
+            <a:pPr lvl="1"/>
+            <a:r>
+              <a:rPr lang="en-US" dirty="0"/>
+              <a:t>Relative Strength Index(RSI)</a:t>
+            </a:r>
+          </a:p>
+          <a:p>
+            <a:pPr lvl="2"/>
+            <a:r>
+              <a:rPr lang="en-US" dirty="0"/>
+              <a:t>Combined with MA	</a:t>
+            </a:r>
+          </a:p>
+          <a:p>
+            <a:r>
+              <a:rPr lang="en-US" dirty="0"/>
+              <a:t>Planned </a:t>
+            </a:r>
+          </a:p>
+          <a:p>
+            <a:pPr lvl="1"/>
+            <a:r>
+              <a:rPr lang="en-US" dirty="0"/>
+              <a:t>EMA, WMA, CMA and pick the best</a:t>
+            </a:r>
+          </a:p>
+          <a:p>
+            <a:pPr lvl="1"/>
+            <a:r>
+              <a:rPr lang="en-US" dirty="0"/>
+              <a:t>Moving average Convergence divergence(MACD) </a:t>
+            </a:r>
+            <a:br>
+              <a:rPr lang="en-US" dirty="0"/>
+            </a:br>
+            <a:r>
+              <a:rPr lang="en-US" dirty="0"/>
+              <a:t>+ RSI</a:t>
+            </a:r>
+          </a:p>
+          <a:p>
+            <a:endParaRPr lang="en-US" dirty="0"/>
+          </a:p>
+          <a:p>
+            <a:endParaRPr lang="en-US" dirty="0"/>
+          </a:p>
+        </p:txBody>
+      </p:sp>
+    </p:spTree>
+    <p:extLst>
+      <p:ext uri="{BB962C8B-B14F-4D97-AF65-F5344CB8AC3E}">
+        <p14:creationId xmlns:p14="http://schemas.microsoft.com/office/powerpoint/2010/main" val="733561012"/>
+      </p:ext>
+    </p:extLst>
+  </p:cSld>
+  <p:clrMapOvr>
+    <a:masterClrMapping/>
+  </p:clrMapOvr>
+</p:sld>
+</file>
+
+<file path=ppt/slides/slide5.xml><?xml version="1.0" encoding="utf-8"?>
+<p:sld xmlns:a="http://schemas.openxmlformats.org/drawingml/2006/main" xmlns:r="http://schemas.openxmlformats.org/officeDocument/2006/relationships" xmlns:p="http://schemas.openxmlformats.org/presentationml/2006/main">
+  <p:cSld>
+    <p:spTree>
+      <p:nvGrpSpPr>
+        <p:cNvPr id="1" name=""/>
+        <p:cNvGrpSpPr/>
+        <p:nvPr/>
+      </p:nvGrpSpPr>
+      <p:grpSpPr>
+        <a:xfrm>
+          <a:off x="0" y="0"/>
+          <a:ext cx="0" cy="0"/>
+          <a:chOff x="0" y="0"/>
+          <a:chExt cx="0" cy="0"/>
+        </a:xfrm>
+      </p:grpSpPr>
       <p:pic>
         <p:nvPicPr>
           <p:cNvPr id="4" name="Picture 3">
@@ -5905,7 +6198,7 @@
 </p:sld>
 </file>
 
-<file path=ppt/slides/slide5.xml><?xml version="1.0" encoding="utf-8"?>
+<file path=ppt/slides/slide6.xml><?xml version="1.0" encoding="utf-8"?>
 <p:sld xmlns:a="http://schemas.openxmlformats.org/drawingml/2006/main" xmlns:r="http://schemas.openxmlformats.org/officeDocument/2006/relationships" xmlns:p="http://schemas.openxmlformats.org/presentationml/2006/main">
   <p:cSld>
     <p:spTree>
@@ -5958,6 +6251,36 @@
           </a:prstGeom>
         </p:spPr>
       </p:pic>
+      <p:pic>
+        <p:nvPicPr>
+          <p:cNvPr id="2" name="Picture 1">
+            <a:extLst>
+              <a:ext uri="{FF2B5EF4-FFF2-40B4-BE49-F238E27FC236}">
+                <a16:creationId xmlns:a16="http://schemas.microsoft.com/office/drawing/2014/main" id="{F2907595-A82D-0C61-0077-E84DD009A8BD}"/>
+              </a:ext>
+            </a:extLst>
+          </p:cNvPr>
+          <p:cNvPicPr>
+            <a:picLocks noChangeAspect="1"/>
+          </p:cNvPicPr>
+          <p:nvPr/>
+        </p:nvPicPr>
+        <p:blipFill>
+          <a:blip r:embed="rId3"/>
+          <a:stretch>
+            <a:fillRect/>
+          </a:stretch>
+        </p:blipFill>
+        <p:spPr>
+          <a:xfrm>
+            <a:off x="1033106" y="3426307"/>
+            <a:ext cx="7772400" cy="2830775"/>
+          </a:xfrm>
+          <a:prstGeom prst="rect">
+            <a:avLst/>
+          </a:prstGeom>
+        </p:spPr>
+      </p:pic>
     </p:spTree>
     <p:extLst>
       <p:ext uri="{BB962C8B-B14F-4D97-AF65-F5344CB8AC3E}">
@@ -5971,7 +6294,7 @@
 </p:sld>
 </file>
 
-<file path=ppt/slides/slide6.xml><?xml version="1.0" encoding="utf-8"?>
+<file path=ppt/slides/slide7.xml><?xml version="1.0" encoding="utf-8"?>
 <p:sld xmlns:a="http://schemas.openxmlformats.org/drawingml/2006/main" xmlns:r="http://schemas.openxmlformats.org/officeDocument/2006/relationships" xmlns:p="http://schemas.openxmlformats.org/presentationml/2006/main">
   <p:cSld>
     <p:spTree>
@@ -6039,20 +6362,20 @@
           <a:p>
             <a:r>
               <a:rPr lang="en-US" dirty="0"/>
-              <a:t>Optimized Moving average windows</a:t>
+              <a:t>Evaluating using performance metrics</a:t>
             </a:r>
           </a:p>
           <a:p>
             <a:r>
               <a:rPr lang="en-US" dirty="0"/>
-              <a:t>RSI lookback period optimization</a:t>
-            </a:r>
-          </a:p>
-          <a:p>
-            <a:r>
-              <a:rPr lang="en-US" dirty="0"/>
-              <a:t>Tested in Different Market Regimes</a:t>
-            </a:r>
+              <a:t>Back testing Moving averages </a:t>
+            </a:r>
+          </a:p>
+          <a:p>
+            <a:pPr marL="0" indent="0">
+              <a:buNone/>
+            </a:pPr>
+            <a:endParaRPr lang="en-US" dirty="0"/>
           </a:p>
         </p:txBody>
       </p:sp>
@@ -6586,20 +6909,20 @@
 </file>
 
 <file path=customXml/item1.xml><?xml version="1.0" encoding="utf-8"?>
+<p:properties xmlns:p="http://schemas.microsoft.com/office/2006/metadata/properties" xmlns:xsi="http://www.w3.org/2001/XMLSchema-instance" xmlns:pc="http://schemas.microsoft.com/office/infopath/2007/PartnerControls">
+  <documentManagement>
+    <_activity xmlns="7075bad5-233c-4b0e-9903-8affd2618abc" xsi:nil="true"/>
+  </documentManagement>
+</p:properties>
+</file>
+
+<file path=customXml/item2.xml><?xml version="1.0" encoding="utf-8"?>
 <?mso-contentType ?>
 <FormTemplates xmlns="http://schemas.microsoft.com/sharepoint/v3/contenttype/forms">
   <Display>DocumentLibraryForm</Display>
   <Edit>DocumentLibraryForm</Edit>
   <New>DocumentLibraryForm</New>
 </FormTemplates>
-</file>
-
-<file path=customXml/item2.xml><?xml version="1.0" encoding="utf-8"?>
-<p:properties xmlns:p="http://schemas.microsoft.com/office/2006/metadata/properties" xmlns:xsi="http://www.w3.org/2001/XMLSchema-instance" xmlns:pc="http://schemas.microsoft.com/office/infopath/2007/PartnerControls">
-  <documentManagement>
-    <_activity xmlns="7075bad5-233c-4b0e-9903-8affd2618abc" xsi:nil="true"/>
-  </documentManagement>
-</p:properties>
 </file>
 
 <file path=customXml/item3.xml><?xml version="1.0" encoding="utf-8"?>
@@ -6792,14 +7115,6 @@
 </file>
 
 <file path=customXml/itemProps1.xml><?xml version="1.0" encoding="utf-8"?>
-<ds:datastoreItem xmlns:ds="http://schemas.openxmlformats.org/officeDocument/2006/customXml" ds:itemID="{6FA10C29-5137-49FA-9F2D-040C21F563DC}">
-  <ds:schemaRefs>
-    <ds:schemaRef ds:uri="http://schemas.microsoft.com/sharepoint/v3/contenttype/forms"/>
-  </ds:schemaRefs>
-</ds:datastoreItem>
-</file>
-
-<file path=customXml/itemProps2.xml><?xml version="1.0" encoding="utf-8"?>
 <ds:datastoreItem xmlns:ds="http://schemas.openxmlformats.org/officeDocument/2006/customXml" ds:itemID="{1EB1D61D-03E6-4AE6-9AEB-4C0517DF9C10}">
   <ds:schemaRefs>
     <ds:schemaRef ds:uri="http://www.w3.org/XML/1998/namespace"/>
@@ -6812,6 +7127,14 @@
     <ds:schemaRef ds:uri="http://schemas.openxmlformats.org/package/2006/metadata/core-properties"/>
     <ds:schemaRef ds:uri="http://schemas.microsoft.com/office/2006/metadata/properties"/>
     <ds:schemaRef ds:uri="http://purl.org/dc/terms/"/>
+  </ds:schemaRefs>
+</ds:datastoreItem>
+</file>
+
+<file path=customXml/itemProps2.xml><?xml version="1.0" encoding="utf-8"?>
+<ds:datastoreItem xmlns:ds="http://schemas.openxmlformats.org/officeDocument/2006/customXml" ds:itemID="{6FA10C29-5137-49FA-9F2D-040C21F563DC}">
+  <ds:schemaRefs>
+    <ds:schemaRef ds:uri="http://schemas.microsoft.com/sharepoint/v3/contenttype/forms"/>
   </ds:schemaRefs>
 </ds:datastoreItem>
 </file>

</xml_diff>

<commit_message>
new pipelines, new forecasters
</commit_message>
<xml_diff>
--- a/presentation/Standup 1.pptx
+++ b/presentation/Standup 1.pptx
@@ -564,6 +564,97 @@
 </file>
 
 <file path=ppt/notesSlides/notesSlide2.xml><?xml version="1.0" encoding="utf-8"?>
+<p:notes xmlns:a="http://schemas.openxmlformats.org/drawingml/2006/main" xmlns:r="http://schemas.openxmlformats.org/officeDocument/2006/relationships" xmlns:p="http://schemas.openxmlformats.org/presentationml/2006/main">
+  <p:cSld>
+    <p:spTree>
+      <p:nvGrpSpPr>
+        <p:cNvPr id="1" name=""/>
+        <p:cNvGrpSpPr/>
+        <p:nvPr/>
+      </p:nvGrpSpPr>
+      <p:grpSpPr>
+        <a:xfrm>
+          <a:off x="0" y="0"/>
+          <a:ext cx="0" cy="0"/>
+          <a:chOff x="0" y="0"/>
+          <a:chExt cx="0" cy="0"/>
+        </a:xfrm>
+      </p:grpSpPr>
+      <p:sp>
+        <p:nvSpPr>
+          <p:cNvPr id="2" name="Slide Image Placeholder 1"/>
+          <p:cNvSpPr>
+            <a:spLocks noGrp="1" noRot="1" noChangeAspect="1"/>
+          </p:cNvSpPr>
+          <p:nvPr>
+            <p:ph type="sldImg"/>
+          </p:nvPr>
+        </p:nvSpPr>
+        <p:spPr/>
+      </p:sp>
+      <p:sp>
+        <p:nvSpPr>
+          <p:cNvPr id="3" name="Notes Placeholder 2"/>
+          <p:cNvSpPr>
+            <a:spLocks noGrp="1"/>
+          </p:cNvSpPr>
+          <p:nvPr>
+            <p:ph type="body" idx="1"/>
+          </p:nvPr>
+        </p:nvSpPr>
+        <p:spPr/>
+        <p:txBody>
+          <a:bodyPr/>
+          <a:lstStyle/>
+          <a:p>
+            <a:r>
+              <a:rPr lang="en-US" b="1" dirty="0"/>
+              <a:t>Back testing</a:t>
+            </a:r>
+            <a:r>
+              <a:rPr lang="en-US" dirty="0"/>
+              <a:t> is the process of evaluating a trading strategy or investment model by applying it to historical data to see how it would have performed in the past.</a:t>
+            </a:r>
+          </a:p>
+        </p:txBody>
+      </p:sp>
+      <p:sp>
+        <p:nvSpPr>
+          <p:cNvPr id="4" name="Slide Number Placeholder 3"/>
+          <p:cNvSpPr>
+            <a:spLocks noGrp="1"/>
+          </p:cNvSpPr>
+          <p:nvPr>
+            <p:ph type="sldNum" sz="quarter" idx="5"/>
+          </p:nvPr>
+        </p:nvSpPr>
+        <p:spPr/>
+        <p:txBody>
+          <a:bodyPr/>
+          <a:lstStyle/>
+          <a:p>
+            <a:fld id="{531D13CD-66F2-4CB3-ACBB-6CF6081D754D}" type="slidenum">
+              <a:rPr lang="en-US" smtClean="0"/>
+              <a:t>4</a:t>
+            </a:fld>
+            <a:endParaRPr lang="en-US"/>
+          </a:p>
+        </p:txBody>
+      </p:sp>
+    </p:spTree>
+    <p:extLst>
+      <p:ext uri="{BB962C8B-B14F-4D97-AF65-F5344CB8AC3E}">
+        <p14:creationId xmlns:p14="http://schemas.microsoft.com/office/powerpoint/2010/main" val="843297527"/>
+      </p:ext>
+    </p:extLst>
+  </p:cSld>
+  <p:clrMapOvr>
+    <a:masterClrMapping/>
+  </p:clrMapOvr>
+</p:notes>
+</file>
+
+<file path=ppt/notesSlides/notesSlide3.xml><?xml version="1.0" encoding="utf-8"?>
 <p:notes xmlns:a="http://schemas.openxmlformats.org/drawingml/2006/main" xmlns:r="http://schemas.openxmlformats.org/officeDocument/2006/relationships" xmlns:p="http://schemas.openxmlformats.org/presentationml/2006/main">
   <p:cSld>
     <p:spTree>

</xml_diff>